<commit_message>
init Lottery by 小傅哥
</commit_message>
<xml_diff>
--- a/doc/assets/ppt/系统设计.pptx
+++ b/doc/assets/ppt/系统设计.pptx
@@ -138,6 +138,60 @@
     </p:extLst>
   </p:cmAuthor>
 </p:cmAuthorLst>
+</file>
+
+<file path=ppt/ink/ink1.xml><?xml version="1.0" encoding="utf-8"?>
+<inkml:ink xmlns:inkml="http://www.w3.org/2003/InkML">
+  <inkml:definitions>
+    <inkml:context xml:id="ctx0">
+      <inkml:inkSource xml:id="inkSrc0">
+        <inkml:traceFormat>
+          <inkml:channel name="X" type="integer" min="-2.14748E9" max="2.14748E9" units="cm"/>
+          <inkml:channel name="Y" type="integer" min="-2.14748E9" max="2.14748E9" units="cm"/>
+          <inkml:channel name="F" type="integer" max="32767" units="dev"/>
+        </inkml:traceFormat>
+        <inkml:channelProperties>
+          <inkml:channelProperty channel="X" name="resolution" value="1000" units="1/cm"/>
+          <inkml:channelProperty channel="Y" name="resolution" value="1000" units="1/cm"/>
+          <inkml:channelProperty channel="F" name="resolution" value="0" units="1/dev"/>
+        </inkml:channelProperties>
+      </inkml:inkSource>
+      <inkml:timestamp xml:id="ts0" timeString="2021-08-01T06:10:46.894"/>
+    </inkml:context>
+    <inkml:brush xml:id="br0">
+      <inkml:brushProperty name="width" value="0.05" units="cm"/>
+      <inkml:brushProperty name="height" value="0.05" units="cm"/>
+    </inkml:brush>
+  </inkml:definitions>
+  <inkml:trace contextRef="#ctx0" brushRef="#br0">0 2 24575,'43'0'0,"1"0"0,48 0 0,2 0-1652,-26 0 0,4 0 1652,0-1 0,3 2-980,17 5 1,2 4 979,-1 2 0,-4 1 0,-15-2 0,-1 3 40,9 9 0,-5 0-40,-25-10 0,-1 1-225,15 9 1,-2 4 224,-17-5 0,-3 0 0,23 16 1366,-16 13-1366,-31-14 2340,3 11-2340,-20 21 0,-3-6 0,-7 18 0,-6-2 751,-13-2-751,8-28 0,-1 0 0,-18 35 518,6-13-518,1-10 0,11-22 0,-7 9 0,10-21 0,2-2 589,7-18-589,2-2 68,1-3-68,0-2 0,-1 0 0,1 0 0,0 0 0,-3 0 0,-7 0 0,-4 0 0,-5 0 0,-1 0 0,0 0 0,0-3 0,7 0 0,0 0 0,12-1 0,0 3 0,5-1 0</inkml:trace>
+</inkml:ink>
+</file>
+
+<file path=ppt/ink/ink2.xml><?xml version="1.0" encoding="utf-8"?>
+<inkml:ink xmlns:inkml="http://www.w3.org/2003/InkML">
+  <inkml:definitions>
+    <inkml:context xml:id="ctx0">
+      <inkml:inkSource xml:id="inkSrc0">
+        <inkml:traceFormat>
+          <inkml:channel name="X" type="integer" min="-2.14748E9" max="2.14748E9" units="cm"/>
+          <inkml:channel name="Y" type="integer" min="-2.14748E9" max="2.14748E9" units="cm"/>
+          <inkml:channel name="F" type="integer" max="32767" units="dev"/>
+        </inkml:traceFormat>
+        <inkml:channelProperties>
+          <inkml:channelProperty channel="X" name="resolution" value="1000" units="1/cm"/>
+          <inkml:channelProperty channel="Y" name="resolution" value="1000" units="1/cm"/>
+          <inkml:channelProperty channel="F" name="resolution" value="0" units="1/dev"/>
+        </inkml:channelProperties>
+      </inkml:inkSource>
+      <inkml:timestamp xml:id="ts0" timeString="2021-08-01T06:10:48.431"/>
+    </inkml:context>
+    <inkml:brush xml:id="br0">
+      <inkml:brushProperty name="width" value="0.05" units="cm"/>
+      <inkml:brushProperty name="height" value="0.05" units="cm"/>
+    </inkml:brush>
+  </inkml:definitions>
+  <inkml:trace contextRef="#ctx0" brushRef="#br0">0 2821 24575,'64'0'0,"14"0"0,-14 0 0,6 0-2171,10 0 0,4 0 2171,10-1 0,3 2-716,-26 0 0,2 0 0,1 2 716,-1 2 0,0 2 0,1 0 0,-1 0 0,1 2 0,-1 1 0,1 3 0,0 3 0,-4-2 23,5 0 1,-1 1-24,18 5 0,-8-1-413,-14-2 413,-6-2 0,-2-1 0,1 3 1724,14 7-1724,-19-8 2783,-20-2-2783,-7-5 1746,-13-3-1746,-4-1 603,-8-2-603,-1-1 0,2-2 0,3 0 0,11 0 0,8-10 0,27-21 0,7-9 0,-20 2 0,1-5-861,1 1 1,-1-4 860,5-15 0,1-10-1301,-4 4 0,2-7 0,-3-2 1301,-4-4 0,-2-2 0,1-4-1039,-2 8 1,1-4 0,0-2-1,-4-1 1039,-5 0 0,-2-2 0,-3 1 0,-1 2 0,5-11 0,-2 3 0,-2-4-501,-5 10 1,0-5 0,-2 3 0,-3 7 500,2-17 0,-2 5-105,-2 21 0,0-2 0,-1 4 105,-1-5 0,-1 4 826,0 9 1,0 1-827,-2-3 0,0 4 3897,5-26-3897,-6 38 3205,-1 22-3205,-1 12 2275,-2 11-2275,-1 4 1064,-6 5-1064,-2 0 0,-2 1 0,-1 0 0,4-2 0,-2 2 0,4-3 0,-1 1 0,4-1 0,-2 1 0,0-3 0,1 2 0,0-4 0,1 2 0</inkml:trace>
+</inkml:ink>
 </file>
 
 <file path=ppt/notesMasters/notesMaster1.xml><?xml version="1.0" encoding="utf-8"?>
@@ -7643,6 +7697,189 @@
           <a:chExt cx="0" cy="0"/>
         </a:xfrm>
       </p:grpSpPr>
+      <p:sp>
+        <p:nvSpPr>
+          <p:cNvPr id="3" name="上弧形箭头 2">
+            <a:extLst>
+              <a:ext uri="{FF2B5EF4-FFF2-40B4-BE49-F238E27FC236}">
+                <a16:creationId xmlns:a16="http://schemas.microsoft.com/office/drawing/2014/main" id="{6F33ABC3-4408-0544-83FB-BF757A495CF5}"/>
+              </a:ext>
+            </a:extLst>
+          </p:cNvPr>
+          <p:cNvSpPr/>
+          <p:nvPr/>
+        </p:nvSpPr>
+        <p:spPr>
+          <a:xfrm rot="8482118" flipH="1">
+            <a:off x="2153976" y="1846254"/>
+            <a:ext cx="860781" cy="431256"/>
+          </a:xfrm>
+          <a:prstGeom prst="curvedUpArrow">
+            <a:avLst>
+              <a:gd name="adj1" fmla="val 5701"/>
+              <a:gd name="adj2" fmla="val 36851"/>
+              <a:gd name="adj3" fmla="val 61349"/>
+            </a:avLst>
+          </a:prstGeom>
+          <a:solidFill>
+            <a:srgbClr val="FF0000"/>
+          </a:solidFill>
+          <a:ln>
+            <a:noFill/>
+          </a:ln>
+        </p:spPr>
+        <p:style>
+          <a:lnRef idx="2">
+            <a:schemeClr val="accent1">
+              <a:shade val="50000"/>
+            </a:schemeClr>
+          </a:lnRef>
+          <a:fillRef idx="1">
+            <a:schemeClr val="accent1"/>
+          </a:fillRef>
+          <a:effectRef idx="0">
+            <a:schemeClr val="accent1"/>
+          </a:effectRef>
+          <a:fontRef idx="minor">
+            <a:schemeClr val="lt1"/>
+          </a:fontRef>
+        </p:style>
+        <p:txBody>
+          <a:bodyPr rtlCol="0" anchor="ctr"/>
+          <a:lstStyle/>
+          <a:p>
+            <a:pPr algn="ctr"/>
+            <a:endParaRPr kumimoji="1" lang="zh-CN" altLang="en-US">
+              <a:solidFill>
+                <a:srgbClr val="FF0000"/>
+              </a:solidFill>
+            </a:endParaRPr>
+          </a:p>
+        </p:txBody>
+      </p:sp>
+      <p:grpSp>
+        <p:nvGrpSpPr>
+          <p:cNvPr id="6" name="组合 5">
+            <a:extLst>
+              <a:ext uri="{FF2B5EF4-FFF2-40B4-BE49-F238E27FC236}">
+                <a16:creationId xmlns:a16="http://schemas.microsoft.com/office/drawing/2014/main" id="{3C4E626E-4720-C248-9EB5-8A4D80C7F576}"/>
+              </a:ext>
+            </a:extLst>
+          </p:cNvPr>
+          <p:cNvGrpSpPr/>
+          <p:nvPr/>
+        </p:nvGrpSpPr>
+        <p:grpSpPr>
+          <a:xfrm>
+            <a:off x="431768" y="295294"/>
+            <a:ext cx="1315440" cy="1124640"/>
+            <a:chOff x="431768" y="295294"/>
+            <a:chExt cx="1315440" cy="1124640"/>
+          </a:xfrm>
+        </p:grpSpPr>
+        <mc:AlternateContent xmlns:mc="http://schemas.openxmlformats.org/markup-compatibility/2006">
+          <mc:Choice xmlns:p14="http://schemas.microsoft.com/office/powerpoint/2010/main" Requires="p14">
+            <p:contentPart p14:bwMode="auto" r:id="rId2">
+              <p14:nvContentPartPr>
+                <p14:cNvPr id="4" name="墨迹 3">
+                  <a:extLst>
+                    <a:ext uri="{FF2B5EF4-FFF2-40B4-BE49-F238E27FC236}">
+                      <a16:creationId xmlns:a16="http://schemas.microsoft.com/office/drawing/2014/main" id="{A71BC027-FC6D-5947-9A8D-F23F7A56AC23}"/>
+                    </a:ext>
+                  </a:extLst>
+                </p14:cNvPr>
+                <p14:cNvContentPartPr/>
+                <p14:nvPr/>
+              </p14:nvContentPartPr>
+              <p14:xfrm>
+                <a:off x="431768" y="724774"/>
+                <a:ext cx="620280" cy="448200"/>
+              </p14:xfrm>
+            </p:contentPart>
+          </mc:Choice>
+          <mc:Fallback>
+            <p:pic>
+              <p:nvPicPr>
+                <p:cNvPr id="4" name="墨迹 3">
+                  <a:extLst>
+                    <a:ext uri="{FF2B5EF4-FFF2-40B4-BE49-F238E27FC236}">
+                      <a16:creationId xmlns:a16="http://schemas.microsoft.com/office/drawing/2014/main" id="{A71BC027-FC6D-5947-9A8D-F23F7A56AC23}"/>
+                    </a:ext>
+                  </a:extLst>
+                </p:cNvPr>
+                <p:cNvPicPr/>
+                <p:nvPr/>
+              </p:nvPicPr>
+              <p:blipFill>
+                <a:blip r:embed="rId3"/>
+                <a:stretch>
+                  <a:fillRect/>
+                </a:stretch>
+              </p:blipFill>
+              <p:spPr>
+                <a:xfrm>
+                  <a:off x="422768" y="716134"/>
+                  <a:ext cx="637920" cy="465840"/>
+                </a:xfrm>
+                <a:prstGeom prst="rect">
+                  <a:avLst/>
+                </a:prstGeom>
+              </p:spPr>
+            </p:pic>
+          </mc:Fallback>
+        </mc:AlternateContent>
+        <mc:AlternateContent xmlns:mc="http://schemas.openxmlformats.org/markup-compatibility/2006">
+          <mc:Choice xmlns:p14="http://schemas.microsoft.com/office/powerpoint/2010/main" Requires="p14">
+            <p:contentPart p14:bwMode="auto" r:id="rId4">
+              <p14:nvContentPartPr>
+                <p14:cNvPr id="5" name="墨迹 4">
+                  <a:extLst>
+                    <a:ext uri="{FF2B5EF4-FFF2-40B4-BE49-F238E27FC236}">
+                      <a16:creationId xmlns:a16="http://schemas.microsoft.com/office/drawing/2014/main" id="{7D5C07FE-257A-1B42-A231-23B62A071A45}"/>
+                    </a:ext>
+                  </a:extLst>
+                </p14:cNvPr>
+                <p14:cNvContentPartPr/>
+                <p14:nvPr/>
+              </p14:nvContentPartPr>
+              <p14:xfrm>
+                <a:off x="438968" y="295294"/>
+                <a:ext cx="1308240" cy="1124640"/>
+              </p14:xfrm>
+            </p:contentPart>
+          </mc:Choice>
+          <mc:Fallback>
+            <p:pic>
+              <p:nvPicPr>
+                <p:cNvPr id="5" name="墨迹 4">
+                  <a:extLst>
+                    <a:ext uri="{FF2B5EF4-FFF2-40B4-BE49-F238E27FC236}">
+                      <a16:creationId xmlns:a16="http://schemas.microsoft.com/office/drawing/2014/main" id="{7D5C07FE-257A-1B42-A231-23B62A071A45}"/>
+                    </a:ext>
+                  </a:extLst>
+                </p:cNvPr>
+                <p:cNvPicPr/>
+                <p:nvPr/>
+              </p:nvPicPr>
+              <p:blipFill>
+                <a:blip r:embed="rId5"/>
+                <a:stretch>
+                  <a:fillRect/>
+                </a:stretch>
+              </p:blipFill>
+              <p:spPr>
+                <a:xfrm>
+                  <a:off x="429968" y="286294"/>
+                  <a:ext cx="1325880" cy="1142280"/>
+                </a:xfrm>
+                <a:prstGeom prst="rect">
+                  <a:avLst/>
+                </a:prstGeom>
+              </p:spPr>
+            </p:pic>
+          </mc:Fallback>
+        </mc:AlternateContent>
+      </p:grpSp>
     </p:spTree>
     <p:extLst>
       <p:ext uri="{BB962C8B-B14F-4D97-AF65-F5344CB8AC3E}">

</xml_diff>